<commit_message>
browsing slides, change slides, maybe some changes in future
</commit_message>
<xml_diff>
--- a/slides/S1_IntroR_0403.pptx
+++ b/slides/S1_IntroR_0403.pptx
@@ -274,7 +274,7 @@
               <a:pPr>
                 <a:defRPr/>
               </a:pPr>
-              <a:t>2015/4/2</a:t>
+              <a:t>16/3/25</a:t>
             </a:fld>
             <a:endParaRPr lang="zh-CN" altLang="en-US"/>
           </a:p>
@@ -797,14 +797,14 @@
           </a:ln>
           <a:extLst>
             <a:ext uri="{909E8E84-426E-40dd-AFC4-6F175D3DCCD1}">
-              <a14:hiddenFill xmlns="" xmlns:a14="http://schemas.microsoft.com/office/drawing/2010/main">
+              <a14:hiddenFill xmlns:a14="http://schemas.microsoft.com/office/drawing/2010/main" xmlns="">
                 <a:solidFill>
                   <a:srgbClr val="FFFFFF"/>
                 </a:solidFill>
               </a14:hiddenFill>
             </a:ext>
             <a:ext uri="{91240B29-F687-4f45-9708-019B960494DF}">
-              <a14:hiddenLine xmlns="" xmlns:a14="http://schemas.microsoft.com/office/drawing/2010/main" w="9525">
+              <a14:hiddenLine xmlns:a14="http://schemas.microsoft.com/office/drawing/2010/main" xmlns="" w="9525">
                 <a:solidFill>
                   <a:srgbClr val="000000"/>
                 </a:solidFill>
@@ -903,14 +903,14 @@
           </a:ln>
           <a:extLst>
             <a:ext uri="{909E8E84-426E-40dd-AFC4-6F175D3DCCD1}">
-              <a14:hiddenFill xmlns="" xmlns:a14="http://schemas.microsoft.com/office/drawing/2010/main">
+              <a14:hiddenFill xmlns:a14="http://schemas.microsoft.com/office/drawing/2010/main" xmlns="">
                 <a:solidFill>
                   <a:srgbClr val="FFFFFF"/>
                 </a:solidFill>
               </a14:hiddenFill>
             </a:ext>
             <a:ext uri="{91240B29-F687-4f45-9708-019B960494DF}">
-              <a14:hiddenLine xmlns="" xmlns:a14="http://schemas.microsoft.com/office/drawing/2010/main" w="9525">
+              <a14:hiddenLine xmlns:a14="http://schemas.microsoft.com/office/drawing/2010/main" xmlns="" w="9525">
                 <a:solidFill>
                   <a:srgbClr val="000000"/>
                 </a:solidFill>
@@ -1111,7 +1111,7 @@
               <a:pPr>
                 <a:defRPr/>
               </a:pPr>
-              <a:t>4/2/2015</a:t>
+              <a:t>3/25/16</a:t>
             </a:fld>
             <a:endParaRPr lang="en-US" altLang="zh-CN"/>
           </a:p>
@@ -1326,7 +1326,7 @@
               <a:pPr>
                 <a:defRPr/>
               </a:pPr>
-              <a:t>4/2/2015</a:t>
+              <a:t>3/25/16</a:t>
             </a:fld>
             <a:endParaRPr lang="en-US" altLang="zh-CN"/>
           </a:p>
@@ -1533,7 +1533,7 @@
               <a:pPr>
                 <a:defRPr/>
               </a:pPr>
-              <a:t>4/2/2015</a:t>
+              <a:t>3/25/16</a:t>
             </a:fld>
             <a:endParaRPr lang="en-US" altLang="zh-CN"/>
           </a:p>
@@ -1771,14 +1771,14 @@
           </a:ln>
           <a:extLst>
             <a:ext uri="{909E8E84-426E-40dd-AFC4-6F175D3DCCD1}">
-              <a14:hiddenFill xmlns="" xmlns:a14="http://schemas.microsoft.com/office/drawing/2010/main">
+              <a14:hiddenFill xmlns:a14="http://schemas.microsoft.com/office/drawing/2010/main" xmlns="">
                 <a:solidFill>
                   <a:srgbClr val="FFFFFF"/>
                 </a:solidFill>
               </a14:hiddenFill>
             </a:ext>
             <a:ext uri="{91240B29-F687-4f45-9708-019B960494DF}">
-              <a14:hiddenLine xmlns="" xmlns:a14="http://schemas.microsoft.com/office/drawing/2010/main" w="9525">
+              <a14:hiddenLine xmlns:a14="http://schemas.microsoft.com/office/drawing/2010/main" xmlns="" w="9525">
                 <a:solidFill>
                   <a:srgbClr val="000000"/>
                 </a:solidFill>
@@ -1993,7 +1993,7 @@
               <a:pPr>
                 <a:defRPr/>
               </a:pPr>
-              <a:t>4/2/2015</a:t>
+              <a:t>3/25/16</a:t>
             </a:fld>
             <a:endParaRPr lang="en-US" altLang="zh-CN"/>
           </a:p>
@@ -2266,7 +2266,7 @@
               <a:pPr>
                 <a:defRPr/>
               </a:pPr>
-              <a:t>4/2/2015</a:t>
+              <a:t>3/25/16</a:t>
             </a:fld>
             <a:endParaRPr lang="en-US" altLang="zh-CN"/>
           </a:p>
@@ -2581,7 +2581,7 @@
               <a:pPr>
                 <a:defRPr/>
               </a:pPr>
-              <a:t>4/2/2015</a:t>
+              <a:t>3/25/16</a:t>
             </a:fld>
             <a:endParaRPr lang="en-US" altLang="zh-CN"/>
           </a:p>
@@ -3030,7 +3030,7 @@
               <a:pPr>
                 <a:defRPr/>
               </a:pPr>
-              <a:t>4/2/2015</a:t>
+              <a:t>3/25/16</a:t>
             </a:fld>
             <a:endParaRPr lang="en-US" altLang="zh-CN"/>
           </a:p>
@@ -3175,7 +3175,7 @@
               <a:pPr>
                 <a:defRPr/>
               </a:pPr>
-              <a:t>4/2/2015</a:t>
+              <a:t>3/25/16</a:t>
             </a:fld>
             <a:endParaRPr lang="en-US" altLang="zh-CN"/>
           </a:p>
@@ -3297,7 +3297,7 @@
               <a:pPr>
                 <a:defRPr/>
               </a:pPr>
-              <a:t>4/2/2015</a:t>
+              <a:t>3/25/16</a:t>
             </a:fld>
             <a:endParaRPr lang="en-US" altLang="zh-CN"/>
           </a:p>
@@ -3601,7 +3601,7 @@
               <a:pPr>
                 <a:defRPr/>
               </a:pPr>
-              <a:t>4/2/2015</a:t>
+              <a:t>3/25/16</a:t>
             </a:fld>
             <a:endParaRPr lang="en-US" altLang="zh-CN"/>
           </a:p>
@@ -3884,7 +3884,7 @@
               <a:pPr>
                 <a:defRPr/>
               </a:pPr>
-              <a:t>4/2/2015</a:t>
+              <a:t>3/25/16</a:t>
             </a:fld>
             <a:endParaRPr lang="en-US" altLang="zh-CN"/>
           </a:p>
@@ -4008,14 +4008,14 @@
           </a:ln>
           <a:extLst>
             <a:ext uri="{909E8E84-426E-40dd-AFC4-6F175D3DCCD1}">
-              <a14:hiddenFill xmlns="" xmlns:a14="http://schemas.microsoft.com/office/drawing/2010/main">
+              <a14:hiddenFill xmlns:a14="http://schemas.microsoft.com/office/drawing/2010/main" xmlns="">
                 <a:solidFill>
                   <a:srgbClr val="FFFFFF"/>
                 </a:solidFill>
               </a14:hiddenFill>
             </a:ext>
             <a:ext uri="{91240B29-F687-4f45-9708-019B960494DF}">
-              <a14:hiddenLine xmlns="" xmlns:a14="http://schemas.microsoft.com/office/drawing/2010/main" w="9525">
+              <a14:hiddenLine xmlns:a14="http://schemas.microsoft.com/office/drawing/2010/main" xmlns="" w="9525">
                 <a:solidFill>
                   <a:srgbClr val="000000"/>
                 </a:solidFill>
@@ -4066,14 +4066,14 @@
           </a:ln>
           <a:extLst>
             <a:ext uri="{909E8E84-426E-40dd-AFC4-6F175D3DCCD1}">
-              <a14:hiddenFill xmlns="" xmlns:a14="http://schemas.microsoft.com/office/drawing/2010/main">
+              <a14:hiddenFill xmlns:a14="http://schemas.microsoft.com/office/drawing/2010/main" xmlns="">
                 <a:solidFill>
                   <a:srgbClr val="FFFFFF"/>
                 </a:solidFill>
               </a14:hiddenFill>
             </a:ext>
             <a:ext uri="{91240B29-F687-4f45-9708-019B960494DF}">
-              <a14:hiddenLine xmlns="" xmlns:a14="http://schemas.microsoft.com/office/drawing/2010/main" w="9525">
+              <a14:hiddenLine xmlns:a14="http://schemas.microsoft.com/office/drawing/2010/main" xmlns="" w="9525">
                 <a:solidFill>
                   <a:srgbClr val="000000"/>
                 </a:solidFill>
@@ -4172,7 +4172,7 @@
               <a:pPr>
                 <a:defRPr/>
               </a:pPr>
-              <a:t>4/2/2015</a:t>
+              <a:t>3/25/16</a:t>
             </a:fld>
             <a:endParaRPr lang="en-US" altLang="zh-CN"/>
           </a:p>
@@ -4743,14 +4743,20 @@
           <a:p>
             <a:r>
               <a:rPr lang="en-US" dirty="0" smtClean="0"/>
-              <a:t>IND E 321</a:t>
-            </a:r>
-          </a:p>
-          <a:p>
+              <a:t>IND E </a:t>
+            </a:r>
             <a:r>
               <a:rPr lang="en-US" dirty="0" smtClean="0"/>
-              <a:t>Yan Jin (yanjin@uw.edu)</a:t>
-            </a:r>
+              <a:t>321 Spring 2016</a:t>
+            </a:r>
+            <a:endParaRPr lang="en-US" dirty="0" smtClean="0"/>
+          </a:p>
+          <a:p>
+            <a:r>
+              <a:rPr lang="en-US" dirty="0" smtClean="0"/>
+              <a:t>Ning Li(ningli30@uw.edu)</a:t>
+            </a:r>
+            <a:endParaRPr lang="en-US" dirty="0" smtClean="0"/>
           </a:p>
           <a:p>
             <a:r>
@@ -5546,54 +5552,6 @@
             </a:pPr>
             <a:endParaRPr lang="en-US" sz="2000" dirty="0" smtClean="0"/>
           </a:p>
-          <a:p>
-            <a:pPr lvl="1"/>
-            <a:r>
-              <a:rPr lang="en-US" sz="2000" dirty="0" smtClean="0"/>
-              <a:t>Excel (.</a:t>
-            </a:r>
-            <a:r>
-              <a:rPr lang="en-US" sz="2000" dirty="0" err="1" smtClean="0"/>
-              <a:t>xls</a:t>
-            </a:r>
-            <a:r>
-              <a:rPr lang="en-US" sz="2000" dirty="0" smtClean="0"/>
-              <a:t>)</a:t>
-            </a:r>
-          </a:p>
-          <a:p>
-            <a:pPr marL="457200" lvl="1" indent="0">
-              <a:buNone/>
-            </a:pPr>
-            <a:endParaRPr lang="en-US" sz="2000" dirty="0" smtClean="0"/>
-          </a:p>
-          <a:p>
-            <a:pPr marL="457200" lvl="1" indent="0">
-              <a:buNone/>
-            </a:pPr>
-            <a:endParaRPr lang="en-US" sz="2000" dirty="0" smtClean="0"/>
-          </a:p>
-          <a:p>
-            <a:pPr lvl="1"/>
-            <a:r>
-              <a:rPr lang="en-US" sz="2000" dirty="0" smtClean="0"/>
-              <a:t>Minitab (.</a:t>
-            </a:r>
-            <a:r>
-              <a:rPr lang="en-US" sz="2000" dirty="0" err="1" smtClean="0"/>
-              <a:t>mtp</a:t>
-            </a:r>
-            <a:r>
-              <a:rPr lang="en-US" sz="2000" dirty="0" smtClean="0"/>
-              <a:t>)</a:t>
-            </a:r>
-          </a:p>
-          <a:p>
-            <a:pPr marL="457200" lvl="1" indent="0">
-              <a:buNone/>
-            </a:pPr>
-            <a:endParaRPr lang="en-US" sz="2000" dirty="0" smtClean="0"/>
-          </a:p>
         </p:txBody>
       </p:sp>
       <p:sp>
@@ -5651,7 +5609,7 @@
       </p:pic>
       <p:pic>
         <p:nvPicPr>
-          <p:cNvPr id="7" name="Picture 6"/>
+          <p:cNvPr id="9" name="Picture 8"/>
           <p:cNvPicPr>
             <a:picLocks noChangeAspect="1"/>
           </p:cNvPicPr>
@@ -5659,54 +5617,6 @@
         </p:nvPicPr>
         <p:blipFill>
           <a:blip r:embed="rId3"/>
-          <a:stretch>
-            <a:fillRect/>
-          </a:stretch>
-        </p:blipFill>
-        <p:spPr>
-          <a:xfrm>
-            <a:off x="1676400" y="3611237"/>
-            <a:ext cx="6010275" cy="609600"/>
-          </a:xfrm>
-          <a:prstGeom prst="rect">
-            <a:avLst/>
-          </a:prstGeom>
-        </p:spPr>
-      </p:pic>
-      <p:pic>
-        <p:nvPicPr>
-          <p:cNvPr id="8" name="Picture 7"/>
-          <p:cNvPicPr>
-            <a:picLocks noChangeAspect="1"/>
-          </p:cNvPicPr>
-          <p:nvPr/>
-        </p:nvPicPr>
-        <p:blipFill>
-          <a:blip r:embed="rId4"/>
-          <a:stretch>
-            <a:fillRect/>
-          </a:stretch>
-        </p:blipFill>
-        <p:spPr>
-          <a:xfrm>
-            <a:off x="1647824" y="4695481"/>
-            <a:ext cx="6067425" cy="590550"/>
-          </a:xfrm>
-          <a:prstGeom prst="rect">
-            <a:avLst/>
-          </a:prstGeom>
-        </p:spPr>
-      </p:pic>
-      <p:pic>
-        <p:nvPicPr>
-          <p:cNvPr id="9" name="Picture 8"/>
-          <p:cNvPicPr>
-            <a:picLocks noChangeAspect="1"/>
-          </p:cNvPicPr>
-          <p:nvPr/>
-        </p:nvPicPr>
-        <p:blipFill>
-          <a:blip r:embed="rId5"/>
           <a:stretch>
             <a:fillRect/>
           </a:stretch>
@@ -7012,11 +6922,7 @@
           <a:p>
             <a:r>
               <a:rPr lang="en-US" sz="2400" dirty="0" smtClean="0"/>
-              <a:t>R for data analysis </a:t>
-            </a:r>
-            <a:r>
-              <a:rPr lang="en-US" sz="2400" dirty="0" smtClean="0"/>
-              <a:t>I</a:t>
+              <a:t>R for data analysis I</a:t>
             </a:r>
           </a:p>
           <a:p>
@@ -7024,24 +6930,16 @@
               <a:rPr lang="en-US" sz="2400" dirty="0" smtClean="0"/>
               <a:t>Homework solution I</a:t>
             </a:r>
-            <a:endParaRPr lang="en-US" sz="2400" dirty="0" smtClean="0"/>
           </a:p>
           <a:p>
             <a:r>
               <a:rPr lang="en-US" sz="2400" dirty="0" smtClean="0"/>
-              <a:t>Minitab </a:t>
+              <a:t>Homework </a:t>
             </a:r>
             <a:r>
               <a:rPr lang="en-US" sz="2400" dirty="0" smtClean="0"/>
-              <a:t>session</a:t>
-            </a:r>
-          </a:p>
-          <a:p>
-            <a:r>
-              <a:rPr lang="en-US" sz="2400" dirty="0" smtClean="0"/>
-              <a:t>Homework solution II</a:t>
-            </a:r>
-            <a:endParaRPr lang="en-US" sz="2400" dirty="0" smtClean="0"/>
+              <a:t>solution II</a:t>
+            </a:r>
           </a:p>
           <a:p>
             <a:r>
@@ -9578,14 +9476,14 @@
           </a:ln>
           <a:extLst>
             <a:ext uri="{909E8E84-426E-40dd-AFC4-6F175D3DCCD1}">
-              <a14:hiddenFill xmlns="" xmlns:a14="http://schemas.microsoft.com/office/drawing/2010/main">
+              <a14:hiddenFill xmlns:a14="http://schemas.microsoft.com/office/drawing/2010/main" xmlns="">
                 <a:solidFill>
                   <a:srgbClr val="FFFFFF"/>
                 </a:solidFill>
               </a14:hiddenFill>
             </a:ext>
             <a:ext uri="{91240B29-F687-4f45-9708-019B960494DF}">
-              <a14:hiddenLine xmlns="" xmlns:a14="http://schemas.microsoft.com/office/drawing/2010/main" w="9525">
+              <a14:hiddenLine xmlns:a14="http://schemas.microsoft.com/office/drawing/2010/main" xmlns="" w="9525">
                 <a:solidFill>
                   <a:srgbClr val="000000"/>
                 </a:solidFill>

</xml_diff>